<commit_message>
+docx doc for analysis of optimization source code, .ll file for licm optimization (required for loop unswitch opt); .ll file for loop unswitch now can be compiled from licm.ll file
</commit_message>
<xml_diff>
--- a/results/loopunsw.pptx
+++ b/results/loopunsw.pptx
@@ -214,7 +214,7 @@
           <a:p>
             <a:fld id="{1C61C22C-D72C-4DF3-BADB-5C4A8D331989}" type="datetimeFigureOut">
               <a:rPr lang="en-GB" smtClean="0"/>
-              <a:t>03/11/2021</a:t>
+              <a:t>04/11/2021</a:t>
             </a:fld>
             <a:endParaRPr lang="en-GB"/>
           </a:p>
@@ -391,7 +391,7 @@
           <a:p>
             <a:fld id="{C79F8535-EB9F-4BFC-AEF7-2FAC1BF82268}" type="datetimeFigureOut">
               <a:rPr lang="en-GB" smtClean="0"/>
-              <a:t>03/11/2021</a:t>
+              <a:t>04/11/2021</a:t>
             </a:fld>
             <a:endParaRPr lang="en-GB"/>
           </a:p>
@@ -892,7 +892,7 @@
           <a:p>
             <a:fld id="{85F36698-AFBB-4EA7-9690-F2CC6923DD7F}" type="datetime1">
               <a:rPr lang="en-GB" smtClean="0"/>
-              <a:t>03/11/2021</a:t>
+              <a:t>04/11/2021</a:t>
             </a:fld>
             <a:endParaRPr lang="en-GB"/>
           </a:p>
@@ -1092,7 +1092,7 @@
           <a:p>
             <a:fld id="{577F5388-F632-4BEA-B155-050B62B7C225}" type="datetime1">
               <a:rPr lang="en-GB" smtClean="0"/>
-              <a:t>03/11/2021</a:t>
+              <a:t>04/11/2021</a:t>
             </a:fld>
             <a:endParaRPr lang="en-GB"/>
           </a:p>
@@ -1302,7 +1302,7 @@
           <a:p>
             <a:fld id="{7F067C6B-0DB8-4A5C-B503-5EBAD9412FF5}" type="datetime1">
               <a:rPr lang="en-GB" smtClean="0"/>
-              <a:t>03/11/2021</a:t>
+              <a:t>04/11/2021</a:t>
             </a:fld>
             <a:endParaRPr lang="en-GB"/>
           </a:p>
@@ -1502,7 +1502,7 @@
           <a:p>
             <a:fld id="{B4D3F352-B236-48DB-A875-90B85E844AA3}" type="datetime1">
               <a:rPr lang="en-GB" smtClean="0"/>
-              <a:t>03/11/2021</a:t>
+              <a:t>04/11/2021</a:t>
             </a:fld>
             <a:endParaRPr lang="en-GB"/>
           </a:p>
@@ -1778,7 +1778,7 @@
           <a:p>
             <a:fld id="{FAD16181-B6EB-4DAE-A9B1-A66CB3697312}" type="datetime1">
               <a:rPr lang="en-GB" smtClean="0"/>
-              <a:t>03/11/2021</a:t>
+              <a:t>04/11/2021</a:t>
             </a:fld>
             <a:endParaRPr lang="en-GB"/>
           </a:p>
@@ -2046,7 +2046,7 @@
           <a:p>
             <a:fld id="{9E45DDB2-098F-470E-A591-AE1513D94AA7}" type="datetime1">
               <a:rPr lang="en-GB" smtClean="0"/>
-              <a:t>03/11/2021</a:t>
+              <a:t>04/11/2021</a:t>
             </a:fld>
             <a:endParaRPr lang="en-GB"/>
           </a:p>
@@ -2461,7 +2461,7 @@
           <a:p>
             <a:fld id="{B99D8D4F-8A99-4D1B-87B8-C930E08505DA}" type="datetime1">
               <a:rPr lang="en-GB" smtClean="0"/>
-              <a:t>03/11/2021</a:t>
+              <a:t>04/11/2021</a:t>
             </a:fld>
             <a:endParaRPr lang="en-GB"/>
           </a:p>
@@ -2603,7 +2603,7 @@
           <a:p>
             <a:fld id="{128B9DE6-9FE1-475A-9F5C-2BE234CE6BE6}" type="datetime1">
               <a:rPr lang="en-GB" smtClean="0"/>
-              <a:t>03/11/2021</a:t>
+              <a:t>04/11/2021</a:t>
             </a:fld>
             <a:endParaRPr lang="en-GB"/>
           </a:p>
@@ -2716,7 +2716,7 @@
           <a:p>
             <a:fld id="{F5379DF8-89EF-4709-8BAE-85643F853E01}" type="datetime1">
               <a:rPr lang="en-GB" smtClean="0"/>
-              <a:t>03/11/2021</a:t>
+              <a:t>04/11/2021</a:t>
             </a:fld>
             <a:endParaRPr lang="en-GB"/>
           </a:p>
@@ -3029,7 +3029,7 @@
           <a:p>
             <a:fld id="{FD8F1C5D-F986-448E-B963-160E1C0C7077}" type="datetime1">
               <a:rPr lang="en-GB" smtClean="0"/>
-              <a:t>03/11/2021</a:t>
+              <a:t>04/11/2021</a:t>
             </a:fld>
             <a:endParaRPr lang="en-GB"/>
           </a:p>
@@ -3318,7 +3318,7 @@
           <a:p>
             <a:fld id="{3859FDDE-6A5D-48FF-9D9B-333F24E6E689}" type="datetime1">
               <a:rPr lang="en-GB" smtClean="0"/>
-              <a:t>03/11/2021</a:t>
+              <a:t>04/11/2021</a:t>
             </a:fld>
             <a:endParaRPr lang="en-GB"/>
           </a:p>
@@ -3561,7 +3561,7 @@
           <a:p>
             <a:fld id="{68FA7226-7F34-4186-BC48-859F399FC71D}" type="datetime1">
               <a:rPr lang="en-GB" smtClean="0"/>
-              <a:t>03/11/2021</a:t>
+              <a:t>04/11/2021</a:t>
             </a:fld>
             <a:endParaRPr lang="en-GB"/>
           </a:p>
@@ -5143,7 +5143,7 @@
               <a:rPr lang="en-GB" sz="1200" b="1" dirty="0">
                 <a:latin typeface="Consolas" panose="020B0609020204030204" pitchFamily="49" charset="0"/>
               </a:rPr>
-              <a:t>if</a:t>
+              <a:t>if </a:t>
             </a:r>
             <a:r>
               <a:rPr lang="en-GB" sz="1200" dirty="0">

</xml_diff>